<commit_message>
Updated Diagrams and Data
Updated
</commit_message>
<xml_diff>
--- a/Jack Skellington/Concept.pptx
+++ b/Jack Skellington/Concept.pptx
@@ -8,8 +8,11 @@
     <p:sldId id="256" r:id="rId2"/>
     <p:sldId id="260" r:id="rId3"/>
     <p:sldId id="257" r:id="rId4"/>
-    <p:sldId id="258" r:id="rId5"/>
-    <p:sldId id="259" r:id="rId6"/>
+    <p:sldId id="261" r:id="rId5"/>
+    <p:sldId id="258" r:id="rId6"/>
+    <p:sldId id="262" r:id="rId7"/>
+    <p:sldId id="259" r:id="rId8"/>
+    <p:sldId id="263" r:id="rId9"/>
   </p:sldIdLst>
   <p:sldSz cx="9144000" cy="6858000" type="screen4x3"/>
   <p:notesSz cx="6858000" cy="9144000"/>
@@ -108,6 +111,22 @@
       </a:defRPr>
     </a:lvl9pPr>
   </p:defaultTextStyle>
+  <p:extLst>
+    <p:ext uri="{EFAFB233-063F-42B5-8137-9DF3F51BA10A}">
+      <p15:sldGuideLst xmlns:p15="http://schemas.microsoft.com/office/powerpoint/2012/main">
+        <p15:guide id="1" orient="horz" pos="2160">
+          <p15:clr>
+            <a:srgbClr val="A4A3A4"/>
+          </p15:clr>
+        </p15:guide>
+        <p15:guide id="2" pos="2880">
+          <p15:clr>
+            <a:srgbClr val="A4A3A4"/>
+          </p15:clr>
+        </p15:guide>
+      </p15:sldGuideLst>
+    </p:ext>
+  </p:extLst>
 </p:presentation>
 </file>
 
@@ -3589,17 +3608,15 @@
           </p:cNvPicPr>
           <p:nvPr/>
         </p:nvPicPr>
-        <p:blipFill>
+        <p:blipFill rotWithShape="1">
           <a:blip r:embed="rId2" cstate="print"/>
-          <a:srcRect/>
-          <a:stretch>
-            <a:fillRect/>
-          </a:stretch>
+          <a:srcRect l="6547" t="933" r="4701" b="667"/>
+          <a:stretch/>
         </p:blipFill>
         <p:spPr bwMode="auto">
           <a:xfrm>
-            <a:off x="247649" y="0"/>
-            <a:ext cx="8788285" cy="6858000"/>
+            <a:off x="9144" y="64008"/>
+            <a:ext cx="7799832" cy="6748272"/>
           </a:xfrm>
           <a:prstGeom prst="rect">
             <a:avLst/>
@@ -3621,7 +3638,7 @@
         </p:nvSpPr>
         <p:spPr>
           <a:xfrm>
-            <a:off x="4357397" y="73090"/>
+            <a:off x="3543581" y="73090"/>
             <a:ext cx="701350" cy="701350"/>
           </a:xfrm>
           <a:prstGeom prst="ellipse">
@@ -3671,7 +3688,7 @@
         </p:nvCxnSpPr>
         <p:spPr>
           <a:xfrm>
-            <a:off x="4110888" y="73090"/>
+            <a:off x="3297072" y="73090"/>
             <a:ext cx="3887" cy="6635620"/>
           </a:xfrm>
           <a:prstGeom prst="line">
@@ -3706,7 +3723,7 @@
         </p:nvCxnSpPr>
         <p:spPr>
           <a:xfrm>
-            <a:off x="849086" y="1278294"/>
+            <a:off x="35270" y="1278294"/>
             <a:ext cx="7688424" cy="0"/>
           </a:xfrm>
           <a:prstGeom prst="line">
@@ -3741,7 +3758,7 @@
         </p:nvCxnSpPr>
         <p:spPr>
           <a:xfrm>
-            <a:off x="6419461" y="1430694"/>
+            <a:off x="5605645" y="1430694"/>
             <a:ext cx="1399592" cy="0"/>
           </a:xfrm>
           <a:prstGeom prst="line">
@@ -3776,7 +3793,7 @@
         </p:nvCxnSpPr>
         <p:spPr>
           <a:xfrm>
-            <a:off x="5103845" y="1508450"/>
+            <a:off x="4290029" y="1508450"/>
             <a:ext cx="1318727" cy="0"/>
           </a:xfrm>
           <a:prstGeom prst="line">
@@ -3811,7 +3828,7 @@
         </p:nvCxnSpPr>
         <p:spPr>
           <a:xfrm>
-            <a:off x="5060277" y="4478694"/>
+            <a:off x="4246461" y="4478694"/>
             <a:ext cx="0" cy="2211355"/>
           </a:xfrm>
           <a:prstGeom prst="line">
@@ -3846,7 +3863,7 @@
         </p:nvCxnSpPr>
         <p:spPr>
           <a:xfrm>
-            <a:off x="5138033" y="2659224"/>
+            <a:off x="4324217" y="2640936"/>
             <a:ext cx="0" cy="1841242"/>
           </a:xfrm>
           <a:prstGeom prst="line">
@@ -3873,6 +3890,511 @@
           </a:fontRef>
         </p:style>
       </p:cxnSp>
+      <p:sp>
+        <p:nvSpPr>
+          <p:cNvPr id="2" name="Rectangle 1"/>
+          <p:cNvSpPr/>
+          <p:nvPr/>
+        </p:nvSpPr>
+        <p:spPr>
+          <a:xfrm>
+            <a:off x="3511296" y="1078992"/>
+            <a:ext cx="778733" cy="758952"/>
+          </a:xfrm>
+          <a:prstGeom prst="rect">
+            <a:avLst/>
+          </a:prstGeom>
+          <a:solidFill>
+            <a:srgbClr val="FF0000">
+              <a:alpha val="16000"/>
+            </a:srgbClr>
+          </a:solidFill>
+          <a:ln>
+            <a:solidFill>
+              <a:srgbClr val="FF0000"/>
+            </a:solidFill>
+          </a:ln>
+        </p:spPr>
+        <p:style>
+          <a:lnRef idx="2">
+            <a:schemeClr val="accent1">
+              <a:shade val="50000"/>
+            </a:schemeClr>
+          </a:lnRef>
+          <a:fillRef idx="1">
+            <a:schemeClr val="accent1"/>
+          </a:fillRef>
+          <a:effectRef idx="0">
+            <a:schemeClr val="accent1"/>
+          </a:effectRef>
+          <a:fontRef idx="minor">
+            <a:schemeClr val="lt1"/>
+          </a:fontRef>
+        </p:style>
+        <p:txBody>
+          <a:bodyPr rtlCol="0" anchor="ctr"/>
+          <a:lstStyle/>
+          <a:p>
+            <a:pPr algn="ctr"/>
+            <a:endParaRPr lang="en-US"/>
+          </a:p>
+        </p:txBody>
+      </p:sp>
+      <p:cxnSp>
+        <p:nvCxnSpPr>
+          <p:cNvPr id="12" name="Straight Connector 11"/>
+          <p:cNvCxnSpPr>
+            <a:endCxn id="2" idx="0"/>
+          </p:cNvCxnSpPr>
+          <p:nvPr/>
+        </p:nvCxnSpPr>
+        <p:spPr>
+          <a:xfrm>
+            <a:off x="3900545" y="774440"/>
+            <a:ext cx="118" cy="304552"/>
+          </a:xfrm>
+          <a:prstGeom prst="line">
+            <a:avLst/>
+          </a:prstGeom>
+          <a:ln w="38100">
+            <a:solidFill>
+              <a:schemeClr val="tx1"/>
+            </a:solidFill>
+          </a:ln>
+        </p:spPr>
+        <p:style>
+          <a:lnRef idx="1">
+            <a:schemeClr val="accent1"/>
+          </a:lnRef>
+          <a:fillRef idx="0">
+            <a:schemeClr val="accent1"/>
+          </a:fillRef>
+          <a:effectRef idx="0">
+            <a:schemeClr val="accent1"/>
+          </a:effectRef>
+          <a:fontRef idx="minor">
+            <a:schemeClr val="tx1"/>
+          </a:fontRef>
+        </p:style>
+      </p:cxnSp>
+      <p:cxnSp>
+        <p:nvCxnSpPr>
+          <p:cNvPr id="13" name="Straight Connector 12"/>
+          <p:cNvCxnSpPr/>
+          <p:nvPr/>
+        </p:nvCxnSpPr>
+        <p:spPr>
+          <a:xfrm>
+            <a:off x="4421753" y="1078992"/>
+            <a:ext cx="0" cy="1580232"/>
+          </a:xfrm>
+          <a:prstGeom prst="line">
+            <a:avLst/>
+          </a:prstGeom>
+          <a:ln w="38100">
+            <a:solidFill>
+              <a:schemeClr val="tx1"/>
+            </a:solidFill>
+          </a:ln>
+        </p:spPr>
+        <p:style>
+          <a:lnRef idx="1">
+            <a:schemeClr val="accent1"/>
+          </a:lnRef>
+          <a:fillRef idx="0">
+            <a:schemeClr val="accent1"/>
+          </a:fillRef>
+          <a:effectRef idx="0">
+            <a:schemeClr val="accent1"/>
+          </a:effectRef>
+          <a:fontRef idx="minor">
+            <a:schemeClr val="tx1"/>
+          </a:fontRef>
+        </p:style>
+      </p:cxnSp>
+      <p:cxnSp>
+        <p:nvCxnSpPr>
+          <p:cNvPr id="16" name="Straight Connector 15"/>
+          <p:cNvCxnSpPr/>
+          <p:nvPr/>
+        </p:nvCxnSpPr>
+        <p:spPr>
+          <a:xfrm>
+            <a:off x="3900545" y="1837944"/>
+            <a:ext cx="0" cy="338328"/>
+          </a:xfrm>
+          <a:prstGeom prst="line">
+            <a:avLst/>
+          </a:prstGeom>
+          <a:ln w="38100">
+            <a:solidFill>
+              <a:schemeClr val="tx1"/>
+            </a:solidFill>
+          </a:ln>
+        </p:spPr>
+        <p:style>
+          <a:lnRef idx="1">
+            <a:schemeClr val="accent1"/>
+          </a:lnRef>
+          <a:fillRef idx="0">
+            <a:schemeClr val="accent1"/>
+          </a:fillRef>
+          <a:effectRef idx="0">
+            <a:schemeClr val="accent1"/>
+          </a:effectRef>
+          <a:fontRef idx="minor">
+            <a:schemeClr val="tx1"/>
+          </a:fontRef>
+        </p:style>
+      </p:cxnSp>
+      <p:pic>
+        <p:nvPicPr>
+          <p:cNvPr id="8" name="Picture 7"/>
+          <p:cNvPicPr>
+            <a:picLocks noChangeAspect="1"/>
+          </p:cNvPicPr>
+          <p:nvPr/>
+        </p:nvPicPr>
+        <p:blipFill rotWithShape="1">
+          <a:blip r:embed="rId3"/>
+          <a:srcRect l="520" r="329"/>
+          <a:stretch/>
+        </p:blipFill>
+        <p:spPr>
+          <a:xfrm rot="16200000">
+            <a:off x="5080391" y="2999292"/>
+            <a:ext cx="6748272" cy="877704"/>
+          </a:xfrm>
+          <a:prstGeom prst="rect">
+            <a:avLst/>
+          </a:prstGeom>
+        </p:spPr>
+      </p:pic>
+      <p:sp>
+        <p:nvSpPr>
+          <p:cNvPr id="19" name="Rectangle 18"/>
+          <p:cNvSpPr/>
+          <p:nvPr/>
+        </p:nvSpPr>
+        <p:spPr>
+          <a:xfrm>
+            <a:off x="8165940" y="1075944"/>
+            <a:ext cx="601601" cy="758952"/>
+          </a:xfrm>
+          <a:prstGeom prst="rect">
+            <a:avLst/>
+          </a:prstGeom>
+          <a:solidFill>
+            <a:srgbClr val="FF0000">
+              <a:alpha val="16000"/>
+            </a:srgbClr>
+          </a:solidFill>
+          <a:ln>
+            <a:solidFill>
+              <a:srgbClr val="FF0000"/>
+            </a:solidFill>
+          </a:ln>
+        </p:spPr>
+        <p:style>
+          <a:lnRef idx="2">
+            <a:schemeClr val="accent1">
+              <a:shade val="50000"/>
+            </a:schemeClr>
+          </a:lnRef>
+          <a:fillRef idx="1">
+            <a:schemeClr val="accent1"/>
+          </a:fillRef>
+          <a:effectRef idx="0">
+            <a:schemeClr val="accent1"/>
+          </a:effectRef>
+          <a:fontRef idx="minor">
+            <a:schemeClr val="lt1"/>
+          </a:fontRef>
+        </p:style>
+        <p:txBody>
+          <a:bodyPr rtlCol="0" anchor="ctr"/>
+          <a:lstStyle/>
+          <a:p>
+            <a:pPr algn="ctr"/>
+            <a:endParaRPr lang="en-US"/>
+          </a:p>
+        </p:txBody>
+      </p:sp>
+      <p:sp>
+        <p:nvSpPr>
+          <p:cNvPr id="20" name="Oval 19"/>
+          <p:cNvSpPr/>
+          <p:nvPr/>
+        </p:nvSpPr>
+        <p:spPr>
+          <a:xfrm>
+            <a:off x="8103389" y="79186"/>
+            <a:ext cx="701350" cy="701350"/>
+          </a:xfrm>
+          <a:prstGeom prst="ellipse">
+            <a:avLst/>
+          </a:prstGeom>
+          <a:solidFill>
+            <a:srgbClr val="FF0000">
+              <a:alpha val="9000"/>
+            </a:srgbClr>
+          </a:solidFill>
+          <a:ln w="19050">
+            <a:solidFill>
+              <a:srgbClr val="FF0000"/>
+            </a:solidFill>
+          </a:ln>
+        </p:spPr>
+        <p:style>
+          <a:lnRef idx="2">
+            <a:schemeClr val="accent1">
+              <a:shade val="50000"/>
+            </a:schemeClr>
+          </a:lnRef>
+          <a:fillRef idx="1">
+            <a:schemeClr val="accent1"/>
+          </a:fillRef>
+          <a:effectRef idx="0">
+            <a:schemeClr val="accent1"/>
+          </a:effectRef>
+          <a:fontRef idx="minor">
+            <a:schemeClr val="lt1"/>
+          </a:fontRef>
+        </p:style>
+        <p:txBody>
+          <a:bodyPr rtlCol="0" anchor="ctr"/>
+          <a:lstStyle/>
+          <a:p>
+            <a:pPr algn="ctr"/>
+            <a:endParaRPr lang="en-US"/>
+          </a:p>
+        </p:txBody>
+      </p:sp>
+      <p:cxnSp>
+        <p:nvCxnSpPr>
+          <p:cNvPr id="22" name="Straight Connector 21"/>
+          <p:cNvCxnSpPr/>
+          <p:nvPr/>
+        </p:nvCxnSpPr>
+        <p:spPr>
+          <a:xfrm>
+            <a:off x="8579225" y="780536"/>
+            <a:ext cx="118" cy="304552"/>
+          </a:xfrm>
+          <a:prstGeom prst="line">
+            <a:avLst/>
+          </a:prstGeom>
+          <a:ln w="38100">
+            <a:solidFill>
+              <a:schemeClr val="tx1"/>
+            </a:solidFill>
+          </a:ln>
+        </p:spPr>
+        <p:style>
+          <a:lnRef idx="1">
+            <a:schemeClr val="accent1"/>
+          </a:lnRef>
+          <a:fillRef idx="0">
+            <a:schemeClr val="accent1"/>
+          </a:fillRef>
+          <a:effectRef idx="0">
+            <a:schemeClr val="accent1"/>
+          </a:effectRef>
+          <a:fontRef idx="minor">
+            <a:schemeClr val="tx1"/>
+          </a:fontRef>
+        </p:style>
+      </p:cxnSp>
+      <p:cxnSp>
+        <p:nvCxnSpPr>
+          <p:cNvPr id="23" name="Straight Connector 22"/>
+          <p:cNvCxnSpPr/>
+          <p:nvPr/>
+        </p:nvCxnSpPr>
+        <p:spPr>
+          <a:xfrm>
+            <a:off x="8335385" y="2628744"/>
+            <a:ext cx="0" cy="1841242"/>
+          </a:xfrm>
+          <a:prstGeom prst="line">
+            <a:avLst/>
+          </a:prstGeom>
+          <a:ln w="38100">
+            <a:solidFill>
+              <a:schemeClr val="tx1"/>
+            </a:solidFill>
+          </a:ln>
+        </p:spPr>
+        <p:style>
+          <a:lnRef idx="1">
+            <a:schemeClr val="accent1"/>
+          </a:lnRef>
+          <a:fillRef idx="0">
+            <a:schemeClr val="accent1"/>
+          </a:fillRef>
+          <a:effectRef idx="0">
+            <a:schemeClr val="accent1"/>
+          </a:effectRef>
+          <a:fontRef idx="minor">
+            <a:schemeClr val="tx1"/>
+          </a:fontRef>
+        </p:style>
+      </p:cxnSp>
+      <p:cxnSp>
+        <p:nvCxnSpPr>
+          <p:cNvPr id="24" name="Straight Connector 23"/>
+          <p:cNvCxnSpPr/>
+          <p:nvPr/>
+        </p:nvCxnSpPr>
+        <p:spPr>
+          <a:xfrm>
+            <a:off x="8266773" y="4475646"/>
+            <a:ext cx="0" cy="2211355"/>
+          </a:xfrm>
+          <a:prstGeom prst="line">
+            <a:avLst/>
+          </a:prstGeom>
+          <a:ln w="38100">
+            <a:solidFill>
+              <a:schemeClr val="tx1"/>
+            </a:solidFill>
+          </a:ln>
+        </p:spPr>
+        <p:style>
+          <a:lnRef idx="1">
+            <a:schemeClr val="accent1"/>
+          </a:lnRef>
+          <a:fillRef idx="0">
+            <a:schemeClr val="accent1"/>
+          </a:fillRef>
+          <a:effectRef idx="0">
+            <a:schemeClr val="accent1"/>
+          </a:effectRef>
+          <a:fontRef idx="minor">
+            <a:schemeClr val="tx1"/>
+          </a:fontRef>
+        </p:style>
+      </p:cxnSp>
+      <p:cxnSp>
+        <p:nvCxnSpPr>
+          <p:cNvPr id="25" name="Straight Connector 24"/>
+          <p:cNvCxnSpPr/>
+          <p:nvPr/>
+        </p:nvCxnSpPr>
+        <p:spPr>
+          <a:xfrm>
+            <a:off x="8478641" y="1825752"/>
+            <a:ext cx="0" cy="338328"/>
+          </a:xfrm>
+          <a:prstGeom prst="line">
+            <a:avLst/>
+          </a:prstGeom>
+          <a:ln w="38100">
+            <a:solidFill>
+              <a:schemeClr val="tx1"/>
+            </a:solidFill>
+          </a:ln>
+        </p:spPr>
+        <p:style>
+          <a:lnRef idx="1">
+            <a:schemeClr val="accent1"/>
+          </a:lnRef>
+          <a:fillRef idx="0">
+            <a:schemeClr val="accent1"/>
+          </a:fillRef>
+          <a:effectRef idx="0">
+            <a:schemeClr val="accent1"/>
+          </a:effectRef>
+          <a:fontRef idx="minor">
+            <a:schemeClr val="tx1"/>
+          </a:fontRef>
+        </p:style>
+      </p:cxnSp>
+      <p:cxnSp>
+        <p:nvCxnSpPr>
+          <p:cNvPr id="26" name="Straight Connector 25"/>
+          <p:cNvCxnSpPr/>
+          <p:nvPr/>
+        </p:nvCxnSpPr>
+        <p:spPr>
+          <a:xfrm>
+            <a:off x="3664853" y="2529530"/>
+            <a:ext cx="459091" cy="0"/>
+          </a:xfrm>
+          <a:prstGeom prst="line">
+            <a:avLst/>
+          </a:prstGeom>
+          <a:ln w="38100">
+            <a:solidFill>
+              <a:schemeClr val="tx1"/>
+            </a:solidFill>
+          </a:ln>
+        </p:spPr>
+        <p:style>
+          <a:lnRef idx="1">
+            <a:schemeClr val="accent1"/>
+          </a:lnRef>
+          <a:fillRef idx="0">
+            <a:schemeClr val="accent1"/>
+          </a:fillRef>
+          <a:effectRef idx="0">
+            <a:schemeClr val="accent1"/>
+          </a:effectRef>
+          <a:fontRef idx="minor">
+            <a:schemeClr val="tx1"/>
+          </a:fontRef>
+        </p:style>
+      </p:cxnSp>
+      <p:sp>
+        <p:nvSpPr>
+          <p:cNvPr id="27" name="Rectangle 26"/>
+          <p:cNvSpPr/>
+          <p:nvPr/>
+        </p:nvSpPr>
+        <p:spPr>
+          <a:xfrm>
+            <a:off x="3664853" y="2164080"/>
+            <a:ext cx="468001" cy="357892"/>
+          </a:xfrm>
+          <a:prstGeom prst="rect">
+            <a:avLst/>
+          </a:prstGeom>
+          <a:solidFill>
+            <a:srgbClr val="FF0000">
+              <a:alpha val="16000"/>
+            </a:srgbClr>
+          </a:solidFill>
+          <a:ln>
+            <a:solidFill>
+              <a:srgbClr val="FF0000"/>
+            </a:solidFill>
+          </a:ln>
+        </p:spPr>
+        <p:style>
+          <a:lnRef idx="2">
+            <a:schemeClr val="accent1">
+              <a:shade val="50000"/>
+            </a:schemeClr>
+          </a:lnRef>
+          <a:fillRef idx="1">
+            <a:schemeClr val="accent1"/>
+          </a:fillRef>
+          <a:effectRef idx="0">
+            <a:schemeClr val="accent1"/>
+          </a:effectRef>
+          <a:fontRef idx="minor">
+            <a:schemeClr val="lt1"/>
+          </a:fontRef>
+        </p:style>
+        <p:txBody>
+          <a:bodyPr rtlCol="0" anchor="ctr"/>
+          <a:lstStyle/>
+          <a:p>
+            <a:pPr algn="ctr"/>
+            <a:endParaRPr lang="en-US"/>
+          </a:p>
+        </p:txBody>
+      </p:sp>
     </p:spTree>
   </p:cSld>
   <p:clrMapOvr>
@@ -4325,6 +4847,81 @@
           </a:p>
         </p:txBody>
       </p:sp>
+      <p:sp>
+        <p:nvSpPr>
+          <p:cNvPr id="2" name="Oval 1"/>
+          <p:cNvSpPr/>
+          <p:nvPr/>
+        </p:nvSpPr>
+        <p:spPr>
+          <a:xfrm>
+            <a:off x="1682496" y="660430"/>
+            <a:ext cx="5629771" cy="5629771"/>
+          </a:xfrm>
+          <a:prstGeom prst="ellipse">
+            <a:avLst/>
+          </a:prstGeom>
+          <a:solidFill>
+            <a:srgbClr val="FF0000">
+              <a:alpha val="16000"/>
+            </a:srgbClr>
+          </a:solidFill>
+        </p:spPr>
+        <p:style>
+          <a:lnRef idx="2">
+            <a:schemeClr val="accent1">
+              <a:shade val="50000"/>
+            </a:schemeClr>
+          </a:lnRef>
+          <a:fillRef idx="1">
+            <a:schemeClr val="accent1"/>
+          </a:fillRef>
+          <a:effectRef idx="0">
+            <a:schemeClr val="accent1"/>
+          </a:effectRef>
+          <a:fontRef idx="minor">
+            <a:schemeClr val="lt1"/>
+          </a:fontRef>
+        </p:style>
+        <p:txBody>
+          <a:bodyPr rtlCol="0" anchor="ctr"/>
+          <a:lstStyle/>
+          <a:p>
+            <a:pPr algn="ctr"/>
+            <a:endParaRPr lang="en-US"/>
+          </a:p>
+        </p:txBody>
+      </p:sp>
+      <p:cxnSp>
+        <p:nvCxnSpPr>
+          <p:cNvPr id="4" name="Straight Connector 3"/>
+          <p:cNvCxnSpPr/>
+          <p:nvPr/>
+        </p:nvCxnSpPr>
+        <p:spPr>
+          <a:xfrm>
+            <a:off x="2076061" y="2761488"/>
+            <a:ext cx="4925009" cy="0"/>
+          </a:xfrm>
+          <a:prstGeom prst="line">
+            <a:avLst/>
+          </a:prstGeom>
+        </p:spPr>
+        <p:style>
+          <a:lnRef idx="1">
+            <a:schemeClr val="accent1"/>
+          </a:lnRef>
+          <a:fillRef idx="0">
+            <a:schemeClr val="accent1"/>
+          </a:fillRef>
+          <a:effectRef idx="0">
+            <a:schemeClr val="accent1"/>
+          </a:effectRef>
+          <a:fontRef idx="minor">
+            <a:schemeClr val="tx1"/>
+          </a:fontRef>
+        </p:style>
+      </p:cxnSp>
     </p:spTree>
   </p:cSld>
   <p:clrMapOvr>
@@ -4334,6 +4931,429 @@
 </file>
 
 <file path=ppt/slides/slide4.xml><?xml version="1.0" encoding="utf-8"?>
+<p:sld xmlns:a="http://schemas.openxmlformats.org/drawingml/2006/main" xmlns:r="http://schemas.openxmlformats.org/officeDocument/2006/relationships" xmlns:p="http://schemas.openxmlformats.org/presentationml/2006/main">
+  <p:cSld>
+    <p:spTree>
+      <p:nvGrpSpPr>
+        <p:cNvPr id="1" name=""/>
+        <p:cNvGrpSpPr/>
+        <p:nvPr/>
+      </p:nvGrpSpPr>
+      <p:grpSpPr>
+        <a:xfrm>
+          <a:off x="0" y="0"/>
+          <a:ext cx="0" cy="0"/>
+          <a:chOff x="0" y="0"/>
+          <a:chExt cx="0" cy="0"/>
+        </a:xfrm>
+      </p:grpSpPr>
+      <p:sp>
+        <p:nvSpPr>
+          <p:cNvPr id="7" name="Freeform 6"/>
+          <p:cNvSpPr/>
+          <p:nvPr/>
+        </p:nvSpPr>
+        <p:spPr>
+          <a:xfrm>
+            <a:off x="2076061" y="1268963"/>
+            <a:ext cx="4925009" cy="5012094"/>
+          </a:xfrm>
+          <a:custGeom>
+            <a:avLst/>
+            <a:gdLst>
+              <a:gd name="connsiteX0" fmla="*/ 3484984 w 4925009"/>
+              <a:gd name="connsiteY0" fmla="*/ 0 h 5012094"/>
+              <a:gd name="connsiteX1" fmla="*/ 4184780 w 4925009"/>
+              <a:gd name="connsiteY1" fmla="*/ 233266 h 5012094"/>
+              <a:gd name="connsiteX2" fmla="*/ 4520682 w 4925009"/>
+              <a:gd name="connsiteY2" fmla="*/ 559837 h 5012094"/>
+              <a:gd name="connsiteX3" fmla="*/ 4763278 w 4925009"/>
+              <a:gd name="connsiteY3" fmla="*/ 1082351 h 5012094"/>
+              <a:gd name="connsiteX4" fmla="*/ 4912568 w 4925009"/>
+              <a:gd name="connsiteY4" fmla="*/ 2080727 h 5012094"/>
+              <a:gd name="connsiteX5" fmla="*/ 4837923 w 4925009"/>
+              <a:gd name="connsiteY5" fmla="*/ 3163078 h 5012094"/>
+              <a:gd name="connsiteX6" fmla="*/ 4474029 w 4925009"/>
+              <a:gd name="connsiteY6" fmla="*/ 4049486 h 5012094"/>
+              <a:gd name="connsiteX7" fmla="*/ 3736910 w 4925009"/>
+              <a:gd name="connsiteY7" fmla="*/ 4683968 h 5012094"/>
+              <a:gd name="connsiteX8" fmla="*/ 2747866 w 4925009"/>
+              <a:gd name="connsiteY8" fmla="*/ 4982547 h 5012094"/>
+              <a:gd name="connsiteX9" fmla="*/ 1721498 w 4925009"/>
+              <a:gd name="connsiteY9" fmla="*/ 4861249 h 5012094"/>
+              <a:gd name="connsiteX10" fmla="*/ 891074 w 4925009"/>
+              <a:gd name="connsiteY10" fmla="*/ 4217437 h 5012094"/>
+              <a:gd name="connsiteX11" fmla="*/ 312576 w 4925009"/>
+              <a:gd name="connsiteY11" fmla="*/ 2855168 h 5012094"/>
+              <a:gd name="connsiteX12" fmla="*/ 79310 w 4925009"/>
+              <a:gd name="connsiteY12" fmla="*/ 2062066 h 5012094"/>
+              <a:gd name="connsiteX13" fmla="*/ 13996 w 4925009"/>
+              <a:gd name="connsiteY13" fmla="*/ 1334278 h 5012094"/>
+              <a:gd name="connsiteX14" fmla="*/ 163286 w 4925009"/>
+              <a:gd name="connsiteY14" fmla="*/ 597159 h 5012094"/>
+              <a:gd name="connsiteX15" fmla="*/ 405882 w 4925009"/>
+              <a:gd name="connsiteY15" fmla="*/ 242596 h 5012094"/>
+              <a:gd name="connsiteX16" fmla="*/ 517849 w 4925009"/>
+              <a:gd name="connsiteY16" fmla="*/ 186613 h 5012094"/>
+            </a:gdLst>
+            <a:ahLst/>
+            <a:cxnLst>
+              <a:cxn ang="0">
+                <a:pos x="connsiteX0" y="connsiteY0"/>
+              </a:cxn>
+              <a:cxn ang="0">
+                <a:pos x="connsiteX1" y="connsiteY1"/>
+              </a:cxn>
+              <a:cxn ang="0">
+                <a:pos x="connsiteX2" y="connsiteY2"/>
+              </a:cxn>
+              <a:cxn ang="0">
+                <a:pos x="connsiteX3" y="connsiteY3"/>
+              </a:cxn>
+              <a:cxn ang="0">
+                <a:pos x="connsiteX4" y="connsiteY4"/>
+              </a:cxn>
+              <a:cxn ang="0">
+                <a:pos x="connsiteX5" y="connsiteY5"/>
+              </a:cxn>
+              <a:cxn ang="0">
+                <a:pos x="connsiteX6" y="connsiteY6"/>
+              </a:cxn>
+              <a:cxn ang="0">
+                <a:pos x="connsiteX7" y="connsiteY7"/>
+              </a:cxn>
+              <a:cxn ang="0">
+                <a:pos x="connsiteX8" y="connsiteY8"/>
+              </a:cxn>
+              <a:cxn ang="0">
+                <a:pos x="connsiteX9" y="connsiteY9"/>
+              </a:cxn>
+              <a:cxn ang="0">
+                <a:pos x="connsiteX10" y="connsiteY10"/>
+              </a:cxn>
+              <a:cxn ang="0">
+                <a:pos x="connsiteX11" y="connsiteY11"/>
+              </a:cxn>
+              <a:cxn ang="0">
+                <a:pos x="connsiteX12" y="connsiteY12"/>
+              </a:cxn>
+              <a:cxn ang="0">
+                <a:pos x="connsiteX13" y="connsiteY13"/>
+              </a:cxn>
+              <a:cxn ang="0">
+                <a:pos x="connsiteX14" y="connsiteY14"/>
+              </a:cxn>
+              <a:cxn ang="0">
+                <a:pos x="connsiteX15" y="connsiteY15"/>
+              </a:cxn>
+              <a:cxn ang="0">
+                <a:pos x="connsiteX16" y="connsiteY16"/>
+              </a:cxn>
+            </a:cxnLst>
+            <a:rect l="l" t="t" r="r" b="b"/>
+            <a:pathLst>
+              <a:path w="4925009" h="5012094">
+                <a:moveTo>
+                  <a:pt x="3484984" y="0"/>
+                </a:moveTo>
+                <a:cubicBezTo>
+                  <a:pt x="3748574" y="69980"/>
+                  <a:pt x="4012164" y="139960"/>
+                  <a:pt x="4184780" y="233266"/>
+                </a:cubicBezTo>
+                <a:cubicBezTo>
+                  <a:pt x="4357396" y="326572"/>
+                  <a:pt x="4424266" y="418323"/>
+                  <a:pt x="4520682" y="559837"/>
+                </a:cubicBezTo>
+                <a:cubicBezTo>
+                  <a:pt x="4617098" y="701351"/>
+                  <a:pt x="4697964" y="828869"/>
+                  <a:pt x="4763278" y="1082351"/>
+                </a:cubicBezTo>
+                <a:cubicBezTo>
+                  <a:pt x="4828592" y="1335833"/>
+                  <a:pt x="4900127" y="1733939"/>
+                  <a:pt x="4912568" y="2080727"/>
+                </a:cubicBezTo>
+                <a:cubicBezTo>
+                  <a:pt x="4925009" y="2427515"/>
+                  <a:pt x="4911013" y="2834952"/>
+                  <a:pt x="4837923" y="3163078"/>
+                </a:cubicBezTo>
+                <a:cubicBezTo>
+                  <a:pt x="4764833" y="3491204"/>
+                  <a:pt x="4657531" y="3796004"/>
+                  <a:pt x="4474029" y="4049486"/>
+                </a:cubicBezTo>
+                <a:cubicBezTo>
+                  <a:pt x="4290527" y="4302968"/>
+                  <a:pt x="4024604" y="4528458"/>
+                  <a:pt x="3736910" y="4683968"/>
+                </a:cubicBezTo>
+                <a:cubicBezTo>
+                  <a:pt x="3449216" y="4839478"/>
+                  <a:pt x="3083768" y="4953000"/>
+                  <a:pt x="2747866" y="4982547"/>
+                </a:cubicBezTo>
+                <a:cubicBezTo>
+                  <a:pt x="2411964" y="5012094"/>
+                  <a:pt x="2030963" y="4988767"/>
+                  <a:pt x="1721498" y="4861249"/>
+                </a:cubicBezTo>
+                <a:cubicBezTo>
+                  <a:pt x="1412033" y="4733731"/>
+                  <a:pt x="1125894" y="4551784"/>
+                  <a:pt x="891074" y="4217437"/>
+                </a:cubicBezTo>
+                <a:cubicBezTo>
+                  <a:pt x="656254" y="3883090"/>
+                  <a:pt x="447870" y="3214396"/>
+                  <a:pt x="312576" y="2855168"/>
+                </a:cubicBezTo>
+                <a:cubicBezTo>
+                  <a:pt x="177282" y="2495940"/>
+                  <a:pt x="129073" y="2315548"/>
+                  <a:pt x="79310" y="2062066"/>
+                </a:cubicBezTo>
+                <a:cubicBezTo>
+                  <a:pt x="29547" y="1808584"/>
+                  <a:pt x="0" y="1578429"/>
+                  <a:pt x="13996" y="1334278"/>
+                </a:cubicBezTo>
+                <a:cubicBezTo>
+                  <a:pt x="27992" y="1090127"/>
+                  <a:pt x="97972" y="779106"/>
+                  <a:pt x="163286" y="597159"/>
+                </a:cubicBezTo>
+                <a:cubicBezTo>
+                  <a:pt x="228600" y="415212"/>
+                  <a:pt x="346788" y="311020"/>
+                  <a:pt x="405882" y="242596"/>
+                </a:cubicBezTo>
+                <a:cubicBezTo>
+                  <a:pt x="464976" y="174172"/>
+                  <a:pt x="491412" y="180392"/>
+                  <a:pt x="517849" y="186613"/>
+                </a:cubicBezTo>
+              </a:path>
+            </a:pathLst>
+          </a:custGeom>
+          <a:ln w="63500">
+            <a:solidFill>
+              <a:schemeClr val="tx1"/>
+            </a:solidFill>
+          </a:ln>
+        </p:spPr>
+        <p:style>
+          <a:lnRef idx="1">
+            <a:schemeClr val="accent1"/>
+          </a:lnRef>
+          <a:fillRef idx="0">
+            <a:schemeClr val="accent1"/>
+          </a:fillRef>
+          <a:effectRef idx="0">
+            <a:schemeClr val="accent1"/>
+          </a:effectRef>
+          <a:fontRef idx="minor">
+            <a:schemeClr val="tx1"/>
+          </a:fontRef>
+        </p:style>
+        <p:txBody>
+          <a:bodyPr rtlCol="0" anchor="ctr"/>
+          <a:lstStyle/>
+          <a:p>
+            <a:pPr algn="ctr"/>
+            <a:endParaRPr lang="en-US"/>
+          </a:p>
+        </p:txBody>
+      </p:sp>
+      <p:sp>
+        <p:nvSpPr>
+          <p:cNvPr id="8" name="Freeform 7"/>
+          <p:cNvSpPr/>
+          <p:nvPr/>
+        </p:nvSpPr>
+        <p:spPr>
+          <a:xfrm>
+            <a:off x="4544008" y="690465"/>
+            <a:ext cx="1045029" cy="587829"/>
+          </a:xfrm>
+          <a:custGeom>
+            <a:avLst/>
+            <a:gdLst>
+              <a:gd name="connsiteX0" fmla="*/ 1045029 w 1045029"/>
+              <a:gd name="connsiteY0" fmla="*/ 587829 h 587829"/>
+              <a:gd name="connsiteX1" fmla="*/ 438539 w 1045029"/>
+              <a:gd name="connsiteY1" fmla="*/ 363894 h 587829"/>
+              <a:gd name="connsiteX2" fmla="*/ 0 w 1045029"/>
+              <a:gd name="connsiteY2" fmla="*/ 0 h 587829"/>
+            </a:gdLst>
+            <a:ahLst/>
+            <a:cxnLst>
+              <a:cxn ang="0">
+                <a:pos x="connsiteX0" y="connsiteY0"/>
+              </a:cxn>
+              <a:cxn ang="0">
+                <a:pos x="connsiteX1" y="connsiteY1"/>
+              </a:cxn>
+              <a:cxn ang="0">
+                <a:pos x="connsiteX2" y="connsiteY2"/>
+              </a:cxn>
+            </a:cxnLst>
+            <a:rect l="l" t="t" r="r" b="b"/>
+            <a:pathLst>
+              <a:path w="1045029" h="587829">
+                <a:moveTo>
+                  <a:pt x="1045029" y="587829"/>
+                </a:moveTo>
+                <a:cubicBezTo>
+                  <a:pt x="828869" y="524847"/>
+                  <a:pt x="612710" y="461865"/>
+                  <a:pt x="438539" y="363894"/>
+                </a:cubicBezTo>
+                <a:cubicBezTo>
+                  <a:pt x="264368" y="265923"/>
+                  <a:pt x="52873" y="63759"/>
+                  <a:pt x="0" y="0"/>
+                </a:cubicBezTo>
+              </a:path>
+            </a:pathLst>
+          </a:custGeom>
+          <a:ln w="63500">
+            <a:solidFill>
+              <a:schemeClr val="tx1"/>
+            </a:solidFill>
+          </a:ln>
+        </p:spPr>
+        <p:style>
+          <a:lnRef idx="1">
+            <a:schemeClr val="accent1"/>
+          </a:lnRef>
+          <a:fillRef idx="0">
+            <a:schemeClr val="accent1"/>
+          </a:fillRef>
+          <a:effectRef idx="0">
+            <a:schemeClr val="accent1"/>
+          </a:effectRef>
+          <a:fontRef idx="minor">
+            <a:schemeClr val="tx1"/>
+          </a:fontRef>
+        </p:style>
+        <p:txBody>
+          <a:bodyPr rtlCol="0" anchor="ctr"/>
+          <a:lstStyle/>
+          <a:p>
+            <a:pPr algn="ctr"/>
+            <a:endParaRPr lang="en-US"/>
+          </a:p>
+        </p:txBody>
+      </p:sp>
+      <p:sp>
+        <p:nvSpPr>
+          <p:cNvPr id="9" name="Freeform 8"/>
+          <p:cNvSpPr/>
+          <p:nvPr/>
+        </p:nvSpPr>
+        <p:spPr>
+          <a:xfrm>
+            <a:off x="3032449" y="699796"/>
+            <a:ext cx="1520890" cy="550506"/>
+          </a:xfrm>
+          <a:custGeom>
+            <a:avLst/>
+            <a:gdLst>
+              <a:gd name="connsiteX0" fmla="*/ 0 w 1520890"/>
+              <a:gd name="connsiteY0" fmla="*/ 550506 h 550506"/>
+              <a:gd name="connsiteX1" fmla="*/ 643812 w 1520890"/>
+              <a:gd name="connsiteY1" fmla="*/ 279918 h 550506"/>
+              <a:gd name="connsiteX2" fmla="*/ 1138335 w 1520890"/>
+              <a:gd name="connsiteY2" fmla="*/ 158620 h 550506"/>
+              <a:gd name="connsiteX3" fmla="*/ 1520890 w 1520890"/>
+              <a:gd name="connsiteY3" fmla="*/ 0 h 550506"/>
+            </a:gdLst>
+            <a:ahLst/>
+            <a:cxnLst>
+              <a:cxn ang="0">
+                <a:pos x="connsiteX0" y="connsiteY0"/>
+              </a:cxn>
+              <a:cxn ang="0">
+                <a:pos x="connsiteX1" y="connsiteY1"/>
+              </a:cxn>
+              <a:cxn ang="0">
+                <a:pos x="connsiteX2" y="connsiteY2"/>
+              </a:cxn>
+              <a:cxn ang="0">
+                <a:pos x="connsiteX3" y="connsiteY3"/>
+              </a:cxn>
+            </a:cxnLst>
+            <a:rect l="l" t="t" r="r" b="b"/>
+            <a:pathLst>
+              <a:path w="1520890" h="550506">
+                <a:moveTo>
+                  <a:pt x="0" y="550506"/>
+                </a:moveTo>
+                <a:cubicBezTo>
+                  <a:pt x="227044" y="447869"/>
+                  <a:pt x="454089" y="345232"/>
+                  <a:pt x="643812" y="279918"/>
+                </a:cubicBezTo>
+                <a:cubicBezTo>
+                  <a:pt x="833535" y="214604"/>
+                  <a:pt x="992155" y="205273"/>
+                  <a:pt x="1138335" y="158620"/>
+                </a:cubicBezTo>
+                <a:cubicBezTo>
+                  <a:pt x="1284515" y="111967"/>
+                  <a:pt x="1402702" y="55983"/>
+                  <a:pt x="1520890" y="0"/>
+                </a:cubicBezTo>
+              </a:path>
+            </a:pathLst>
+          </a:custGeom>
+          <a:ln w="63500">
+            <a:solidFill>
+              <a:schemeClr val="tx1"/>
+            </a:solidFill>
+          </a:ln>
+        </p:spPr>
+        <p:style>
+          <a:lnRef idx="1">
+            <a:schemeClr val="accent1"/>
+          </a:lnRef>
+          <a:fillRef idx="0">
+            <a:schemeClr val="accent1"/>
+          </a:fillRef>
+          <a:effectRef idx="0">
+            <a:schemeClr val="accent1"/>
+          </a:effectRef>
+          <a:fontRef idx="minor">
+            <a:schemeClr val="tx1"/>
+          </a:fontRef>
+        </p:style>
+        <p:txBody>
+          <a:bodyPr rtlCol="0" anchor="ctr"/>
+          <a:lstStyle/>
+          <a:p>
+            <a:pPr algn="ctr"/>
+            <a:endParaRPr lang="en-US"/>
+          </a:p>
+        </p:txBody>
+      </p:sp>
+    </p:spTree>
+    <p:extLst>
+      <p:ext uri="{BB962C8B-B14F-4D97-AF65-F5344CB8AC3E}">
+        <p14:creationId xmlns:p14="http://schemas.microsoft.com/office/powerpoint/2010/main" val="521220026"/>
+      </p:ext>
+    </p:extLst>
+  </p:cSld>
+  <p:clrMapOvr>
+    <a:masterClrMapping/>
+  </p:clrMapOvr>
+</p:sld>
+</file>
+
+<file path=ppt/slides/slide5.xml><?xml version="1.0" encoding="utf-8"?>
 <p:sld xmlns:a="http://schemas.openxmlformats.org/drawingml/2006/main" xmlns:r="http://schemas.openxmlformats.org/officeDocument/2006/relationships" xmlns:p="http://schemas.openxmlformats.org/presentationml/2006/main">
   <p:cSld>
     <p:spTree>
@@ -4826,7 +5846,473 @@
 </p:sld>
 </file>
 
-<file path=ppt/slides/slide5.xml><?xml version="1.0" encoding="utf-8"?>
+<file path=ppt/slides/slide6.xml><?xml version="1.0" encoding="utf-8"?>
+<p:sld xmlns:a="http://schemas.openxmlformats.org/drawingml/2006/main" xmlns:r="http://schemas.openxmlformats.org/officeDocument/2006/relationships" xmlns:p="http://schemas.openxmlformats.org/presentationml/2006/main">
+  <p:cSld>
+    <p:spTree>
+      <p:nvGrpSpPr>
+        <p:cNvPr id="1" name=""/>
+        <p:cNvGrpSpPr/>
+        <p:nvPr/>
+      </p:nvGrpSpPr>
+      <p:grpSpPr>
+        <a:xfrm>
+          <a:off x="0" y="0"/>
+          <a:ext cx="0" cy="0"/>
+          <a:chOff x="0" y="0"/>
+          <a:chExt cx="0" cy="0"/>
+        </a:xfrm>
+      </p:grpSpPr>
+      <p:sp>
+        <p:nvSpPr>
+          <p:cNvPr id="7" name="Freeform 6"/>
+          <p:cNvSpPr/>
+          <p:nvPr/>
+        </p:nvSpPr>
+        <p:spPr>
+          <a:xfrm>
+            <a:off x="2097833" y="1233196"/>
+            <a:ext cx="1363824" cy="4316964"/>
+          </a:xfrm>
+          <a:custGeom>
+            <a:avLst/>
+            <a:gdLst>
+              <a:gd name="connsiteX0" fmla="*/ 1363824 w 1363824"/>
+              <a:gd name="connsiteY0" fmla="*/ 4309188 h 4316964"/>
+              <a:gd name="connsiteX1" fmla="*/ 1205204 w 1363824"/>
+              <a:gd name="connsiteY1" fmla="*/ 4262535 h 4316964"/>
+              <a:gd name="connsiteX2" fmla="*/ 748004 w 1363824"/>
+              <a:gd name="connsiteY2" fmla="*/ 3982616 h 4316964"/>
+              <a:gd name="connsiteX3" fmla="*/ 421432 w 1363824"/>
+              <a:gd name="connsiteY3" fmla="*/ 3656045 h 4316964"/>
+              <a:gd name="connsiteX4" fmla="*/ 122853 w 1363824"/>
+              <a:gd name="connsiteY4" fmla="*/ 2984241 h 4316964"/>
+              <a:gd name="connsiteX5" fmla="*/ 1555 w 1363824"/>
+              <a:gd name="connsiteY5" fmla="*/ 2144486 h 4316964"/>
+              <a:gd name="connsiteX6" fmla="*/ 113522 w 1363824"/>
+              <a:gd name="connsiteY6" fmla="*/ 1314061 h 4316964"/>
+              <a:gd name="connsiteX7" fmla="*/ 440094 w 1363824"/>
+              <a:gd name="connsiteY7" fmla="*/ 642257 h 4316964"/>
+              <a:gd name="connsiteX8" fmla="*/ 748004 w 1363824"/>
+              <a:gd name="connsiteY8" fmla="*/ 343677 h 4316964"/>
+              <a:gd name="connsiteX9" fmla="*/ 1214534 w 1363824"/>
+              <a:gd name="connsiteY9" fmla="*/ 54428 h 4316964"/>
+              <a:gd name="connsiteX10" fmla="*/ 1354494 w 1363824"/>
+              <a:gd name="connsiteY10" fmla="*/ 17106 h 4316964"/>
+            </a:gdLst>
+            <a:ahLst/>
+            <a:cxnLst>
+              <a:cxn ang="0">
+                <a:pos x="connsiteX0" y="connsiteY0"/>
+              </a:cxn>
+              <a:cxn ang="0">
+                <a:pos x="connsiteX1" y="connsiteY1"/>
+              </a:cxn>
+              <a:cxn ang="0">
+                <a:pos x="connsiteX2" y="connsiteY2"/>
+              </a:cxn>
+              <a:cxn ang="0">
+                <a:pos x="connsiteX3" y="connsiteY3"/>
+              </a:cxn>
+              <a:cxn ang="0">
+                <a:pos x="connsiteX4" y="connsiteY4"/>
+              </a:cxn>
+              <a:cxn ang="0">
+                <a:pos x="connsiteX5" y="connsiteY5"/>
+              </a:cxn>
+              <a:cxn ang="0">
+                <a:pos x="connsiteX6" y="connsiteY6"/>
+              </a:cxn>
+              <a:cxn ang="0">
+                <a:pos x="connsiteX7" y="connsiteY7"/>
+              </a:cxn>
+              <a:cxn ang="0">
+                <a:pos x="connsiteX8" y="connsiteY8"/>
+              </a:cxn>
+              <a:cxn ang="0">
+                <a:pos x="connsiteX9" y="connsiteY9"/>
+              </a:cxn>
+              <a:cxn ang="0">
+                <a:pos x="connsiteX10" y="connsiteY10"/>
+              </a:cxn>
+            </a:cxnLst>
+            <a:rect l="l" t="t" r="r" b="b"/>
+            <a:pathLst>
+              <a:path w="1363824" h="4316964">
+                <a:moveTo>
+                  <a:pt x="1363824" y="4309188"/>
+                </a:moveTo>
+                <a:cubicBezTo>
+                  <a:pt x="1335832" y="4313076"/>
+                  <a:pt x="1307841" y="4316964"/>
+                  <a:pt x="1205204" y="4262535"/>
+                </a:cubicBezTo>
+                <a:cubicBezTo>
+                  <a:pt x="1102567" y="4208106"/>
+                  <a:pt x="878633" y="4083698"/>
+                  <a:pt x="748004" y="3982616"/>
+                </a:cubicBezTo>
+                <a:cubicBezTo>
+                  <a:pt x="617375" y="3881534"/>
+                  <a:pt x="525624" y="3822441"/>
+                  <a:pt x="421432" y="3656045"/>
+                </a:cubicBezTo>
+                <a:cubicBezTo>
+                  <a:pt x="317240" y="3489649"/>
+                  <a:pt x="192833" y="3236168"/>
+                  <a:pt x="122853" y="2984241"/>
+                </a:cubicBezTo>
+                <a:cubicBezTo>
+                  <a:pt x="52874" y="2732315"/>
+                  <a:pt x="3110" y="2422849"/>
+                  <a:pt x="1555" y="2144486"/>
+                </a:cubicBezTo>
+                <a:cubicBezTo>
+                  <a:pt x="0" y="1866123"/>
+                  <a:pt x="40432" y="1564433"/>
+                  <a:pt x="113522" y="1314061"/>
+                </a:cubicBezTo>
+                <a:cubicBezTo>
+                  <a:pt x="186612" y="1063690"/>
+                  <a:pt x="334347" y="803987"/>
+                  <a:pt x="440094" y="642257"/>
+                </a:cubicBezTo>
+                <a:cubicBezTo>
+                  <a:pt x="545841" y="480527"/>
+                  <a:pt x="618931" y="441648"/>
+                  <a:pt x="748004" y="343677"/>
+                </a:cubicBezTo>
+                <a:cubicBezTo>
+                  <a:pt x="877077" y="245706"/>
+                  <a:pt x="1113452" y="108856"/>
+                  <a:pt x="1214534" y="54428"/>
+                </a:cubicBezTo>
+                <a:cubicBezTo>
+                  <a:pt x="1315616" y="0"/>
+                  <a:pt x="1335055" y="8553"/>
+                  <a:pt x="1354494" y="17106"/>
+                </a:cubicBezTo>
+              </a:path>
+            </a:pathLst>
+          </a:custGeom>
+          <a:ln w="63500">
+            <a:solidFill>
+              <a:schemeClr val="tx1"/>
+            </a:solidFill>
+          </a:ln>
+        </p:spPr>
+        <p:style>
+          <a:lnRef idx="1">
+            <a:schemeClr val="accent1"/>
+          </a:lnRef>
+          <a:fillRef idx="0">
+            <a:schemeClr val="accent1"/>
+          </a:fillRef>
+          <a:effectRef idx="0">
+            <a:schemeClr val="accent1"/>
+          </a:effectRef>
+          <a:fontRef idx="minor">
+            <a:schemeClr val="tx1"/>
+          </a:fontRef>
+        </p:style>
+        <p:txBody>
+          <a:bodyPr rtlCol="0" anchor="ctr"/>
+          <a:lstStyle/>
+          <a:p>
+            <a:pPr algn="ctr"/>
+            <a:endParaRPr lang="en-US"/>
+          </a:p>
+        </p:txBody>
+      </p:sp>
+      <p:sp>
+        <p:nvSpPr>
+          <p:cNvPr id="8" name="Freeform 7"/>
+          <p:cNvSpPr/>
+          <p:nvPr/>
+        </p:nvSpPr>
+        <p:spPr>
+          <a:xfrm>
+            <a:off x="2887824" y="1026368"/>
+            <a:ext cx="4091474" cy="4721289"/>
+          </a:xfrm>
+          <a:custGeom>
+            <a:avLst/>
+            <a:gdLst>
+              <a:gd name="connsiteX0" fmla="*/ 639147 w 4091474"/>
+              <a:gd name="connsiteY0" fmla="*/ 177281 h 4721289"/>
+              <a:gd name="connsiteX1" fmla="*/ 1180323 w 4091474"/>
+              <a:gd name="connsiteY1" fmla="*/ 18661 h 4721289"/>
+              <a:gd name="connsiteX2" fmla="*/ 1749490 w 4091474"/>
+              <a:gd name="connsiteY2" fmla="*/ 65314 h 4721289"/>
+              <a:gd name="connsiteX3" fmla="*/ 2514600 w 4091474"/>
+              <a:gd name="connsiteY3" fmla="*/ 233265 h 4721289"/>
+              <a:gd name="connsiteX4" fmla="*/ 3046445 w 4091474"/>
+              <a:gd name="connsiteY4" fmla="*/ 513183 h 4721289"/>
+              <a:gd name="connsiteX5" fmla="*/ 3578290 w 4091474"/>
+              <a:gd name="connsiteY5" fmla="*/ 989044 h 4721289"/>
+              <a:gd name="connsiteX6" fmla="*/ 3951515 w 4091474"/>
+              <a:gd name="connsiteY6" fmla="*/ 1623526 h 4721289"/>
+              <a:gd name="connsiteX7" fmla="*/ 4091474 w 4091474"/>
+              <a:gd name="connsiteY7" fmla="*/ 2351314 h 4721289"/>
+              <a:gd name="connsiteX8" fmla="*/ 3951515 w 4091474"/>
+              <a:gd name="connsiteY8" fmla="*/ 3097763 h 4721289"/>
+              <a:gd name="connsiteX9" fmla="*/ 3587621 w 4091474"/>
+              <a:gd name="connsiteY9" fmla="*/ 3741575 h 4721289"/>
+              <a:gd name="connsiteX10" fmla="*/ 3065107 w 4091474"/>
+              <a:gd name="connsiteY10" fmla="*/ 4198775 h 4721289"/>
+              <a:gd name="connsiteX11" fmla="*/ 2505270 w 4091474"/>
+              <a:gd name="connsiteY11" fmla="*/ 4506685 h 4721289"/>
+              <a:gd name="connsiteX12" fmla="*/ 1758821 w 4091474"/>
+              <a:gd name="connsiteY12" fmla="*/ 4655975 h 4721289"/>
+              <a:gd name="connsiteX13" fmla="*/ 1124339 w 4091474"/>
+              <a:gd name="connsiteY13" fmla="*/ 4702628 h 4721289"/>
+              <a:gd name="connsiteX14" fmla="*/ 629817 w 4091474"/>
+              <a:gd name="connsiteY14" fmla="*/ 4544008 h 4721289"/>
+              <a:gd name="connsiteX15" fmla="*/ 265923 w 4091474"/>
+              <a:gd name="connsiteY15" fmla="*/ 4292081 h 4721289"/>
+              <a:gd name="connsiteX16" fmla="*/ 88641 w 4091474"/>
+              <a:gd name="connsiteY16" fmla="*/ 3872203 h 4721289"/>
+              <a:gd name="connsiteX17" fmla="*/ 13996 w 4091474"/>
+              <a:gd name="connsiteY17" fmla="*/ 3219061 h 4721289"/>
+              <a:gd name="connsiteX18" fmla="*/ 13996 w 4091474"/>
+              <a:gd name="connsiteY18" fmla="*/ 1604865 h 4721289"/>
+              <a:gd name="connsiteX19" fmla="*/ 97972 w 4091474"/>
+              <a:gd name="connsiteY19" fmla="*/ 858416 h 4721289"/>
+              <a:gd name="connsiteX20" fmla="*/ 265923 w 4091474"/>
+              <a:gd name="connsiteY20" fmla="*/ 419877 h 4721289"/>
+              <a:gd name="connsiteX21" fmla="*/ 639147 w 4091474"/>
+              <a:gd name="connsiteY21" fmla="*/ 177281 h 4721289"/>
+            </a:gdLst>
+            <a:ahLst/>
+            <a:cxnLst>
+              <a:cxn ang="0">
+                <a:pos x="connsiteX0" y="connsiteY0"/>
+              </a:cxn>
+              <a:cxn ang="0">
+                <a:pos x="connsiteX1" y="connsiteY1"/>
+              </a:cxn>
+              <a:cxn ang="0">
+                <a:pos x="connsiteX2" y="connsiteY2"/>
+              </a:cxn>
+              <a:cxn ang="0">
+                <a:pos x="connsiteX3" y="connsiteY3"/>
+              </a:cxn>
+              <a:cxn ang="0">
+                <a:pos x="connsiteX4" y="connsiteY4"/>
+              </a:cxn>
+              <a:cxn ang="0">
+                <a:pos x="connsiteX5" y="connsiteY5"/>
+              </a:cxn>
+              <a:cxn ang="0">
+                <a:pos x="connsiteX6" y="connsiteY6"/>
+              </a:cxn>
+              <a:cxn ang="0">
+                <a:pos x="connsiteX7" y="connsiteY7"/>
+              </a:cxn>
+              <a:cxn ang="0">
+                <a:pos x="connsiteX8" y="connsiteY8"/>
+              </a:cxn>
+              <a:cxn ang="0">
+                <a:pos x="connsiteX9" y="connsiteY9"/>
+              </a:cxn>
+              <a:cxn ang="0">
+                <a:pos x="connsiteX10" y="connsiteY10"/>
+              </a:cxn>
+              <a:cxn ang="0">
+                <a:pos x="connsiteX11" y="connsiteY11"/>
+              </a:cxn>
+              <a:cxn ang="0">
+                <a:pos x="connsiteX12" y="connsiteY12"/>
+              </a:cxn>
+              <a:cxn ang="0">
+                <a:pos x="connsiteX13" y="connsiteY13"/>
+              </a:cxn>
+              <a:cxn ang="0">
+                <a:pos x="connsiteX14" y="connsiteY14"/>
+              </a:cxn>
+              <a:cxn ang="0">
+                <a:pos x="connsiteX15" y="connsiteY15"/>
+              </a:cxn>
+              <a:cxn ang="0">
+                <a:pos x="connsiteX16" y="connsiteY16"/>
+              </a:cxn>
+              <a:cxn ang="0">
+                <a:pos x="connsiteX17" y="connsiteY17"/>
+              </a:cxn>
+              <a:cxn ang="0">
+                <a:pos x="connsiteX18" y="connsiteY18"/>
+              </a:cxn>
+              <a:cxn ang="0">
+                <a:pos x="connsiteX19" y="connsiteY19"/>
+              </a:cxn>
+              <a:cxn ang="0">
+                <a:pos x="connsiteX20" y="connsiteY20"/>
+              </a:cxn>
+              <a:cxn ang="0">
+                <a:pos x="connsiteX21" y="connsiteY21"/>
+              </a:cxn>
+            </a:cxnLst>
+            <a:rect l="l" t="t" r="r" b="b"/>
+            <a:pathLst>
+              <a:path w="4091474" h="4721289">
+                <a:moveTo>
+                  <a:pt x="639147" y="177281"/>
+                </a:moveTo>
+                <a:cubicBezTo>
+                  <a:pt x="791547" y="110412"/>
+                  <a:pt x="995266" y="37322"/>
+                  <a:pt x="1180323" y="18661"/>
+                </a:cubicBezTo>
+                <a:cubicBezTo>
+                  <a:pt x="1365380" y="0"/>
+                  <a:pt x="1527111" y="29547"/>
+                  <a:pt x="1749490" y="65314"/>
+                </a:cubicBezTo>
+                <a:cubicBezTo>
+                  <a:pt x="1971870" y="101081"/>
+                  <a:pt x="2298441" y="158620"/>
+                  <a:pt x="2514600" y="233265"/>
+                </a:cubicBezTo>
+                <a:cubicBezTo>
+                  <a:pt x="2730759" y="307910"/>
+                  <a:pt x="2869163" y="387220"/>
+                  <a:pt x="3046445" y="513183"/>
+                </a:cubicBezTo>
+                <a:cubicBezTo>
+                  <a:pt x="3223727" y="639146"/>
+                  <a:pt x="3427445" y="803987"/>
+                  <a:pt x="3578290" y="989044"/>
+                </a:cubicBezTo>
+                <a:cubicBezTo>
+                  <a:pt x="3729135" y="1174101"/>
+                  <a:pt x="3865984" y="1396481"/>
+                  <a:pt x="3951515" y="1623526"/>
+                </a:cubicBezTo>
+                <a:cubicBezTo>
+                  <a:pt x="4037046" y="1850571"/>
+                  <a:pt x="4091474" y="2105608"/>
+                  <a:pt x="4091474" y="2351314"/>
+                </a:cubicBezTo>
+                <a:cubicBezTo>
+                  <a:pt x="4091474" y="2597020"/>
+                  <a:pt x="4035490" y="2866053"/>
+                  <a:pt x="3951515" y="3097763"/>
+                </a:cubicBezTo>
+                <a:cubicBezTo>
+                  <a:pt x="3867540" y="3329473"/>
+                  <a:pt x="3735356" y="3558073"/>
+                  <a:pt x="3587621" y="3741575"/>
+                </a:cubicBezTo>
+                <a:cubicBezTo>
+                  <a:pt x="3439886" y="3925077"/>
+                  <a:pt x="3245499" y="4071257"/>
+                  <a:pt x="3065107" y="4198775"/>
+                </a:cubicBezTo>
+                <a:cubicBezTo>
+                  <a:pt x="2884715" y="4326293"/>
+                  <a:pt x="2722984" y="4430485"/>
+                  <a:pt x="2505270" y="4506685"/>
+                </a:cubicBezTo>
+                <a:cubicBezTo>
+                  <a:pt x="2287556" y="4582885"/>
+                  <a:pt x="1988976" y="4623318"/>
+                  <a:pt x="1758821" y="4655975"/>
+                </a:cubicBezTo>
+                <a:cubicBezTo>
+                  <a:pt x="1528666" y="4688632"/>
+                  <a:pt x="1312506" y="4721289"/>
+                  <a:pt x="1124339" y="4702628"/>
+                </a:cubicBezTo>
+                <a:cubicBezTo>
+                  <a:pt x="936172" y="4683967"/>
+                  <a:pt x="772886" y="4612433"/>
+                  <a:pt x="629817" y="4544008"/>
+                </a:cubicBezTo>
+                <a:cubicBezTo>
+                  <a:pt x="486748" y="4475583"/>
+                  <a:pt x="356119" y="4404049"/>
+                  <a:pt x="265923" y="4292081"/>
+                </a:cubicBezTo>
+                <a:cubicBezTo>
+                  <a:pt x="175727" y="4180114"/>
+                  <a:pt x="130629" y="4051040"/>
+                  <a:pt x="88641" y="3872203"/>
+                </a:cubicBezTo>
+                <a:cubicBezTo>
+                  <a:pt x="46653" y="3693366"/>
+                  <a:pt x="26437" y="3596951"/>
+                  <a:pt x="13996" y="3219061"/>
+                </a:cubicBezTo>
+                <a:cubicBezTo>
+                  <a:pt x="1555" y="2841171"/>
+                  <a:pt x="0" y="1998306"/>
+                  <a:pt x="13996" y="1604865"/>
+                </a:cubicBezTo>
+                <a:cubicBezTo>
+                  <a:pt x="27992" y="1211424"/>
+                  <a:pt x="55984" y="1055914"/>
+                  <a:pt x="97972" y="858416"/>
+                </a:cubicBezTo>
+                <a:cubicBezTo>
+                  <a:pt x="139960" y="660918"/>
+                  <a:pt x="172617" y="534955"/>
+                  <a:pt x="265923" y="419877"/>
+                </a:cubicBezTo>
+                <a:cubicBezTo>
+                  <a:pt x="359229" y="304799"/>
+                  <a:pt x="486747" y="244150"/>
+                  <a:pt x="639147" y="177281"/>
+                </a:cubicBezTo>
+                <a:close/>
+              </a:path>
+            </a:pathLst>
+          </a:custGeom>
+          <a:noFill/>
+          <a:ln w="63500">
+            <a:solidFill>
+              <a:schemeClr val="tx1"/>
+            </a:solidFill>
+          </a:ln>
+        </p:spPr>
+        <p:style>
+          <a:lnRef idx="2">
+            <a:schemeClr val="accent1">
+              <a:shade val="50000"/>
+            </a:schemeClr>
+          </a:lnRef>
+          <a:fillRef idx="1">
+            <a:schemeClr val="accent1"/>
+          </a:fillRef>
+          <a:effectRef idx="0">
+            <a:schemeClr val="accent1"/>
+          </a:effectRef>
+          <a:fontRef idx="minor">
+            <a:schemeClr val="lt1"/>
+          </a:fontRef>
+        </p:style>
+        <p:txBody>
+          <a:bodyPr rtlCol="0" anchor="ctr"/>
+          <a:lstStyle/>
+          <a:p>
+            <a:pPr algn="ctr"/>
+            <a:endParaRPr lang="en-US"/>
+          </a:p>
+        </p:txBody>
+      </p:sp>
+    </p:spTree>
+    <p:extLst>
+      <p:ext uri="{BB962C8B-B14F-4D97-AF65-F5344CB8AC3E}">
+        <p14:creationId xmlns:p14="http://schemas.microsoft.com/office/powerpoint/2010/main" val="2123889822"/>
+      </p:ext>
+    </p:extLst>
+  </p:cSld>
+  <p:clrMapOvr>
+    <a:masterClrMapping/>
+  </p:clrMapOvr>
+</p:sld>
+</file>
+
+<file path=ppt/slides/slide7.xml><?xml version="1.0" encoding="utf-8"?>
 <p:sld xmlns:a="http://schemas.openxmlformats.org/drawingml/2006/main" xmlns:r="http://schemas.openxmlformats.org/officeDocument/2006/relationships" xmlns:p="http://schemas.openxmlformats.org/presentationml/2006/main">
   <p:cSld>
     <p:spTree>
@@ -5268,6 +6754,428 @@
         </p:txBody>
       </p:sp>
     </p:spTree>
+  </p:cSld>
+  <p:clrMapOvr>
+    <a:masterClrMapping/>
+  </p:clrMapOvr>
+</p:sld>
+</file>
+
+<file path=ppt/slides/slide8.xml><?xml version="1.0" encoding="utf-8"?>
+<p:sld xmlns:a="http://schemas.openxmlformats.org/drawingml/2006/main" xmlns:r="http://schemas.openxmlformats.org/officeDocument/2006/relationships" xmlns:p="http://schemas.openxmlformats.org/presentationml/2006/main">
+  <p:cSld>
+    <p:spTree>
+      <p:nvGrpSpPr>
+        <p:cNvPr id="1" name=""/>
+        <p:cNvGrpSpPr/>
+        <p:nvPr/>
+      </p:nvGrpSpPr>
+      <p:grpSpPr>
+        <a:xfrm>
+          <a:off x="0" y="0"/>
+          <a:ext cx="0" cy="0"/>
+          <a:chOff x="0" y="0"/>
+          <a:chExt cx="0" cy="0"/>
+        </a:xfrm>
+      </p:grpSpPr>
+      <p:sp>
+        <p:nvSpPr>
+          <p:cNvPr id="6" name="Freeform 5"/>
+          <p:cNvSpPr/>
+          <p:nvPr/>
+        </p:nvSpPr>
+        <p:spPr>
+          <a:xfrm>
+            <a:off x="1819469" y="2878494"/>
+            <a:ext cx="429209" cy="1069910"/>
+          </a:xfrm>
+          <a:custGeom>
+            <a:avLst/>
+            <a:gdLst>
+              <a:gd name="connsiteX0" fmla="*/ 419878 w 429209"/>
+              <a:gd name="connsiteY0" fmla="*/ 1059024 h 1069910"/>
+              <a:gd name="connsiteX1" fmla="*/ 354564 w 429209"/>
+              <a:gd name="connsiteY1" fmla="*/ 1003041 h 1069910"/>
+              <a:gd name="connsiteX2" fmla="*/ 55984 w 429209"/>
+              <a:gd name="connsiteY2" fmla="*/ 657808 h 1069910"/>
+              <a:gd name="connsiteX3" fmla="*/ 18662 w 429209"/>
+              <a:gd name="connsiteY3" fmla="*/ 545841 h 1069910"/>
+              <a:gd name="connsiteX4" fmla="*/ 55984 w 429209"/>
+              <a:gd name="connsiteY4" fmla="*/ 405882 h 1069910"/>
+              <a:gd name="connsiteX5" fmla="*/ 354564 w 429209"/>
+              <a:gd name="connsiteY5" fmla="*/ 60649 h 1069910"/>
+              <a:gd name="connsiteX6" fmla="*/ 429209 w 429209"/>
+              <a:gd name="connsiteY6" fmla="*/ 41988 h 1069910"/>
+            </a:gdLst>
+            <a:ahLst/>
+            <a:cxnLst>
+              <a:cxn ang="0">
+                <a:pos x="connsiteX0" y="connsiteY0"/>
+              </a:cxn>
+              <a:cxn ang="0">
+                <a:pos x="connsiteX1" y="connsiteY1"/>
+              </a:cxn>
+              <a:cxn ang="0">
+                <a:pos x="connsiteX2" y="connsiteY2"/>
+              </a:cxn>
+              <a:cxn ang="0">
+                <a:pos x="connsiteX3" y="connsiteY3"/>
+              </a:cxn>
+              <a:cxn ang="0">
+                <a:pos x="connsiteX4" y="connsiteY4"/>
+              </a:cxn>
+              <a:cxn ang="0">
+                <a:pos x="connsiteX5" y="connsiteY5"/>
+              </a:cxn>
+              <a:cxn ang="0">
+                <a:pos x="connsiteX6" y="connsiteY6"/>
+              </a:cxn>
+            </a:cxnLst>
+            <a:rect l="l" t="t" r="r" b="b"/>
+            <a:pathLst>
+              <a:path w="429209" h="1069910">
+                <a:moveTo>
+                  <a:pt x="419878" y="1059024"/>
+                </a:moveTo>
+                <a:cubicBezTo>
+                  <a:pt x="417545" y="1064467"/>
+                  <a:pt x="415213" y="1069910"/>
+                  <a:pt x="354564" y="1003041"/>
+                </a:cubicBezTo>
+                <a:cubicBezTo>
+                  <a:pt x="293915" y="936172"/>
+                  <a:pt x="111968" y="734008"/>
+                  <a:pt x="55984" y="657808"/>
+                </a:cubicBezTo>
+                <a:cubicBezTo>
+                  <a:pt x="0" y="581608"/>
+                  <a:pt x="18662" y="587829"/>
+                  <a:pt x="18662" y="545841"/>
+                </a:cubicBezTo>
+                <a:cubicBezTo>
+                  <a:pt x="18662" y="503853"/>
+                  <a:pt x="0" y="486747"/>
+                  <a:pt x="55984" y="405882"/>
+                </a:cubicBezTo>
+                <a:cubicBezTo>
+                  <a:pt x="111968" y="325017"/>
+                  <a:pt x="292360" y="121298"/>
+                  <a:pt x="354564" y="60649"/>
+                </a:cubicBezTo>
+                <a:cubicBezTo>
+                  <a:pt x="416768" y="0"/>
+                  <a:pt x="422988" y="20994"/>
+                  <a:pt x="429209" y="41988"/>
+                </a:cubicBezTo>
+              </a:path>
+            </a:pathLst>
+          </a:custGeom>
+          <a:ln w="63500">
+            <a:solidFill>
+              <a:schemeClr val="tx1"/>
+            </a:solidFill>
+          </a:ln>
+        </p:spPr>
+        <p:style>
+          <a:lnRef idx="1">
+            <a:schemeClr val="accent1"/>
+          </a:lnRef>
+          <a:fillRef idx="0">
+            <a:schemeClr val="accent1"/>
+          </a:fillRef>
+          <a:effectRef idx="0">
+            <a:schemeClr val="accent1"/>
+          </a:effectRef>
+          <a:fontRef idx="minor">
+            <a:schemeClr val="tx1"/>
+          </a:fontRef>
+        </p:style>
+        <p:txBody>
+          <a:bodyPr rtlCol="0" anchor="ctr"/>
+          <a:lstStyle/>
+          <a:p>
+            <a:pPr algn="ctr"/>
+            <a:endParaRPr lang="en-US"/>
+          </a:p>
+        </p:txBody>
+      </p:sp>
+      <p:sp>
+        <p:nvSpPr>
+          <p:cNvPr id="7" name="Freeform 6"/>
+          <p:cNvSpPr/>
+          <p:nvPr/>
+        </p:nvSpPr>
+        <p:spPr>
+          <a:xfrm>
+            <a:off x="2037183" y="1045029"/>
+            <a:ext cx="5119397" cy="4735286"/>
+          </a:xfrm>
+          <a:custGeom>
+            <a:avLst/>
+            <a:gdLst>
+              <a:gd name="connsiteX0" fmla="*/ 24882 w 5119397"/>
+              <a:gd name="connsiteY0" fmla="*/ 2752530 h 4735286"/>
+              <a:gd name="connsiteX1" fmla="*/ 146180 w 5119397"/>
+              <a:gd name="connsiteY1" fmla="*/ 3004457 h 4735286"/>
+              <a:gd name="connsiteX2" fmla="*/ 901960 w 5119397"/>
+              <a:gd name="connsiteY2" fmla="*/ 3965510 h 4735286"/>
+              <a:gd name="connsiteX3" fmla="*/ 1247193 w 5119397"/>
+              <a:gd name="connsiteY3" fmla="*/ 4273420 h 4735286"/>
+              <a:gd name="connsiteX4" fmla="*/ 1695062 w 5119397"/>
+              <a:gd name="connsiteY4" fmla="*/ 4572000 h 4735286"/>
+              <a:gd name="connsiteX5" fmla="*/ 1974980 w 5119397"/>
+              <a:gd name="connsiteY5" fmla="*/ 4655975 h 4735286"/>
+              <a:gd name="connsiteX6" fmla="*/ 2273560 w 5119397"/>
+              <a:gd name="connsiteY6" fmla="*/ 4693298 h 4735286"/>
+              <a:gd name="connsiteX7" fmla="*/ 2945364 w 5119397"/>
+              <a:gd name="connsiteY7" fmla="*/ 4693298 h 4735286"/>
+              <a:gd name="connsiteX8" fmla="*/ 3878425 w 5119397"/>
+              <a:gd name="connsiteY8" fmla="*/ 4441371 h 4735286"/>
+              <a:gd name="connsiteX9" fmla="*/ 4550229 w 5119397"/>
+              <a:gd name="connsiteY9" fmla="*/ 3834881 h 4735286"/>
+              <a:gd name="connsiteX10" fmla="*/ 4998099 w 5119397"/>
+              <a:gd name="connsiteY10" fmla="*/ 3097763 h 4735286"/>
+              <a:gd name="connsiteX11" fmla="*/ 5119397 w 5119397"/>
+              <a:gd name="connsiteY11" fmla="*/ 2379306 h 4735286"/>
+              <a:gd name="connsiteX12" fmla="*/ 4998099 w 5119397"/>
+              <a:gd name="connsiteY12" fmla="*/ 1642187 h 4735286"/>
+              <a:gd name="connsiteX13" fmla="*/ 4596882 w 5119397"/>
+              <a:gd name="connsiteY13" fmla="*/ 970383 h 4735286"/>
+              <a:gd name="connsiteX14" fmla="*/ 3878425 w 5119397"/>
+              <a:gd name="connsiteY14" fmla="*/ 307910 h 4735286"/>
+              <a:gd name="connsiteX15" fmla="*/ 2898711 w 5119397"/>
+              <a:gd name="connsiteY15" fmla="*/ 37322 h 4735286"/>
+              <a:gd name="connsiteX16" fmla="*/ 1965650 w 5119397"/>
+              <a:gd name="connsiteY16" fmla="*/ 83975 h 4735286"/>
+              <a:gd name="connsiteX17" fmla="*/ 1685731 w 5119397"/>
+              <a:gd name="connsiteY17" fmla="*/ 167951 h 4735286"/>
+              <a:gd name="connsiteX18" fmla="*/ 1228531 w 5119397"/>
+              <a:gd name="connsiteY18" fmla="*/ 457200 h 4735286"/>
+              <a:gd name="connsiteX19" fmla="*/ 883299 w 5119397"/>
+              <a:gd name="connsiteY19" fmla="*/ 755779 h 4735286"/>
+              <a:gd name="connsiteX20" fmla="*/ 164841 w 5119397"/>
+              <a:gd name="connsiteY20" fmla="*/ 1688840 h 4735286"/>
+              <a:gd name="connsiteX21" fmla="*/ 34213 w 5119397"/>
+              <a:gd name="connsiteY21" fmla="*/ 2015412 h 4735286"/>
+            </a:gdLst>
+            <a:ahLst/>
+            <a:cxnLst>
+              <a:cxn ang="0">
+                <a:pos x="connsiteX0" y="connsiteY0"/>
+              </a:cxn>
+              <a:cxn ang="0">
+                <a:pos x="connsiteX1" y="connsiteY1"/>
+              </a:cxn>
+              <a:cxn ang="0">
+                <a:pos x="connsiteX2" y="connsiteY2"/>
+              </a:cxn>
+              <a:cxn ang="0">
+                <a:pos x="connsiteX3" y="connsiteY3"/>
+              </a:cxn>
+              <a:cxn ang="0">
+                <a:pos x="connsiteX4" y="connsiteY4"/>
+              </a:cxn>
+              <a:cxn ang="0">
+                <a:pos x="connsiteX5" y="connsiteY5"/>
+              </a:cxn>
+              <a:cxn ang="0">
+                <a:pos x="connsiteX6" y="connsiteY6"/>
+              </a:cxn>
+              <a:cxn ang="0">
+                <a:pos x="connsiteX7" y="connsiteY7"/>
+              </a:cxn>
+              <a:cxn ang="0">
+                <a:pos x="connsiteX8" y="connsiteY8"/>
+              </a:cxn>
+              <a:cxn ang="0">
+                <a:pos x="connsiteX9" y="connsiteY9"/>
+              </a:cxn>
+              <a:cxn ang="0">
+                <a:pos x="connsiteX10" y="connsiteY10"/>
+              </a:cxn>
+              <a:cxn ang="0">
+                <a:pos x="connsiteX11" y="connsiteY11"/>
+              </a:cxn>
+              <a:cxn ang="0">
+                <a:pos x="connsiteX12" y="connsiteY12"/>
+              </a:cxn>
+              <a:cxn ang="0">
+                <a:pos x="connsiteX13" y="connsiteY13"/>
+              </a:cxn>
+              <a:cxn ang="0">
+                <a:pos x="connsiteX14" y="connsiteY14"/>
+              </a:cxn>
+              <a:cxn ang="0">
+                <a:pos x="connsiteX15" y="connsiteY15"/>
+              </a:cxn>
+              <a:cxn ang="0">
+                <a:pos x="connsiteX16" y="connsiteY16"/>
+              </a:cxn>
+              <a:cxn ang="0">
+                <a:pos x="connsiteX17" y="connsiteY17"/>
+              </a:cxn>
+              <a:cxn ang="0">
+                <a:pos x="connsiteX18" y="connsiteY18"/>
+              </a:cxn>
+              <a:cxn ang="0">
+                <a:pos x="connsiteX19" y="connsiteY19"/>
+              </a:cxn>
+              <a:cxn ang="0">
+                <a:pos x="connsiteX20" y="connsiteY20"/>
+              </a:cxn>
+              <a:cxn ang="0">
+                <a:pos x="connsiteX21" y="connsiteY21"/>
+              </a:cxn>
+            </a:cxnLst>
+            <a:rect l="l" t="t" r="r" b="b"/>
+            <a:pathLst>
+              <a:path w="5119397" h="4735286">
+                <a:moveTo>
+                  <a:pt x="24882" y="2752530"/>
+                </a:moveTo>
+                <a:cubicBezTo>
+                  <a:pt x="12441" y="2777412"/>
+                  <a:pt x="0" y="2802294"/>
+                  <a:pt x="146180" y="3004457"/>
+                </a:cubicBezTo>
+                <a:cubicBezTo>
+                  <a:pt x="292360" y="3206620"/>
+                  <a:pt x="718458" y="3754016"/>
+                  <a:pt x="901960" y="3965510"/>
+                </a:cubicBezTo>
+                <a:cubicBezTo>
+                  <a:pt x="1085462" y="4177004"/>
+                  <a:pt x="1115009" y="4172338"/>
+                  <a:pt x="1247193" y="4273420"/>
+                </a:cubicBezTo>
+                <a:cubicBezTo>
+                  <a:pt x="1379377" y="4374502"/>
+                  <a:pt x="1573764" y="4508241"/>
+                  <a:pt x="1695062" y="4572000"/>
+                </a:cubicBezTo>
+                <a:cubicBezTo>
+                  <a:pt x="1816360" y="4635759"/>
+                  <a:pt x="1878564" y="4635759"/>
+                  <a:pt x="1974980" y="4655975"/>
+                </a:cubicBezTo>
+                <a:cubicBezTo>
+                  <a:pt x="2071396" y="4676191"/>
+                  <a:pt x="2111829" y="4687078"/>
+                  <a:pt x="2273560" y="4693298"/>
+                </a:cubicBezTo>
+                <a:cubicBezTo>
+                  <a:pt x="2435291" y="4699519"/>
+                  <a:pt x="2677887" y="4735286"/>
+                  <a:pt x="2945364" y="4693298"/>
+                </a:cubicBezTo>
+                <a:cubicBezTo>
+                  <a:pt x="3212841" y="4651310"/>
+                  <a:pt x="3610947" y="4584441"/>
+                  <a:pt x="3878425" y="4441371"/>
+                </a:cubicBezTo>
+                <a:cubicBezTo>
+                  <a:pt x="4145903" y="4298301"/>
+                  <a:pt x="4363617" y="4058816"/>
+                  <a:pt x="4550229" y="3834881"/>
+                </a:cubicBezTo>
+                <a:cubicBezTo>
+                  <a:pt x="4736841" y="3610946"/>
+                  <a:pt x="4903238" y="3340359"/>
+                  <a:pt x="4998099" y="3097763"/>
+                </a:cubicBezTo>
+                <a:cubicBezTo>
+                  <a:pt x="5092960" y="2855167"/>
+                  <a:pt x="5119397" y="2621902"/>
+                  <a:pt x="5119397" y="2379306"/>
+                </a:cubicBezTo>
+                <a:cubicBezTo>
+                  <a:pt x="5119397" y="2136710"/>
+                  <a:pt x="5085185" y="1877008"/>
+                  <a:pt x="4998099" y="1642187"/>
+                </a:cubicBezTo>
+                <a:cubicBezTo>
+                  <a:pt x="4911013" y="1407367"/>
+                  <a:pt x="4783494" y="1192762"/>
+                  <a:pt x="4596882" y="970383"/>
+                </a:cubicBezTo>
+                <a:cubicBezTo>
+                  <a:pt x="4410270" y="748004"/>
+                  <a:pt x="4161453" y="463420"/>
+                  <a:pt x="3878425" y="307910"/>
+                </a:cubicBezTo>
+                <a:cubicBezTo>
+                  <a:pt x="3595397" y="152400"/>
+                  <a:pt x="3217507" y="74645"/>
+                  <a:pt x="2898711" y="37322"/>
+                </a:cubicBezTo>
+                <a:cubicBezTo>
+                  <a:pt x="2579915" y="0"/>
+                  <a:pt x="2167813" y="62204"/>
+                  <a:pt x="1965650" y="83975"/>
+                </a:cubicBezTo>
+                <a:cubicBezTo>
+                  <a:pt x="1763487" y="105747"/>
+                  <a:pt x="1808584" y="105747"/>
+                  <a:pt x="1685731" y="167951"/>
+                </a:cubicBezTo>
+                <a:cubicBezTo>
+                  <a:pt x="1562878" y="230155"/>
+                  <a:pt x="1362270" y="359229"/>
+                  <a:pt x="1228531" y="457200"/>
+                </a:cubicBezTo>
+                <a:cubicBezTo>
+                  <a:pt x="1094792" y="555171"/>
+                  <a:pt x="1060581" y="550506"/>
+                  <a:pt x="883299" y="755779"/>
+                </a:cubicBezTo>
+                <a:cubicBezTo>
+                  <a:pt x="706017" y="961052"/>
+                  <a:pt x="306355" y="1478901"/>
+                  <a:pt x="164841" y="1688840"/>
+                </a:cubicBezTo>
+                <a:cubicBezTo>
+                  <a:pt x="23327" y="1898779"/>
+                  <a:pt x="57539" y="1962539"/>
+                  <a:pt x="34213" y="2015412"/>
+                </a:cubicBezTo>
+              </a:path>
+            </a:pathLst>
+          </a:custGeom>
+          <a:ln w="63500">
+            <a:solidFill>
+              <a:schemeClr val="tx1"/>
+            </a:solidFill>
+          </a:ln>
+        </p:spPr>
+        <p:style>
+          <a:lnRef idx="1">
+            <a:schemeClr val="accent1"/>
+          </a:lnRef>
+          <a:fillRef idx="0">
+            <a:schemeClr val="accent1"/>
+          </a:fillRef>
+          <a:effectRef idx="0">
+            <a:schemeClr val="accent1"/>
+          </a:effectRef>
+          <a:fontRef idx="minor">
+            <a:schemeClr val="tx1"/>
+          </a:fontRef>
+        </p:style>
+        <p:txBody>
+          <a:bodyPr rtlCol="0" anchor="ctr"/>
+          <a:lstStyle/>
+          <a:p>
+            <a:pPr algn="ctr"/>
+            <a:endParaRPr lang="en-US"/>
+          </a:p>
+        </p:txBody>
+      </p:sp>
+    </p:spTree>
+    <p:extLst>
+      <p:ext uri="{BB962C8B-B14F-4D97-AF65-F5344CB8AC3E}">
+        <p14:creationId xmlns:p14="http://schemas.microsoft.com/office/powerpoint/2010/main" val="3655311279"/>
+      </p:ext>
+    </p:extLst>
   </p:cSld>
   <p:clrMapOvr>
     <a:masterClrMapping/>

</xml_diff>